<commit_message>
DS18B20 driver code with firebase added
</commit_message>
<xml_diff>
--- a/0_college_review/Review 2_Akshad Patel.pptx
+++ b/0_college_review/Review 2_Akshad Patel.pptx
@@ -4521,7 +4521,7 @@
           <a:p>
             <a:fld id="{6A7ECD7F-C8E1-4D43-90D0-5DE66B274888}" type="datetimeFigureOut">
               <a:rPr lang="en-US" smtClean="0"/>
-              <a:t>2/20/2023</a:t>
+              <a:t>2/27/2023</a:t>
             </a:fld>
             <a:endParaRPr lang="en-US"/>
           </a:p>
@@ -4729,7 +4729,7 @@
           <a:p>
             <a:fld id="{6A7ECD7F-C8E1-4D43-90D0-5DE66B274888}" type="datetimeFigureOut">
               <a:rPr lang="en-US" smtClean="0"/>
-              <a:t>2/20/2023</a:t>
+              <a:t>2/27/2023</a:t>
             </a:fld>
             <a:endParaRPr lang="en-US"/>
           </a:p>
@@ -4985,7 +4985,7 @@
           <a:p>
             <a:fld id="{6A7ECD7F-C8E1-4D43-90D0-5DE66B274888}" type="datetimeFigureOut">
               <a:rPr lang="en-US" smtClean="0"/>
-              <a:t>2/20/2023</a:t>
+              <a:t>2/27/2023</a:t>
             </a:fld>
             <a:endParaRPr lang="en-US"/>
           </a:p>
@@ -5155,7 +5155,7 @@
           <a:p>
             <a:fld id="{6A7ECD7F-C8E1-4D43-90D0-5DE66B274888}" type="datetimeFigureOut">
               <a:rPr lang="en-US" smtClean="0"/>
-              <a:t>2/20/2023</a:t>
+              <a:t>2/27/2023</a:t>
             </a:fld>
             <a:endParaRPr lang="en-US"/>
           </a:p>
@@ -5498,7 +5498,7 @@
           <a:p>
             <a:fld id="{6A7ECD7F-C8E1-4D43-90D0-5DE66B274888}" type="datetimeFigureOut">
               <a:rPr lang="en-US" smtClean="0"/>
-              <a:t>2/20/2023</a:t>
+              <a:t>2/27/2023</a:t>
             </a:fld>
             <a:endParaRPr lang="en-US"/>
           </a:p>
@@ -5773,7 +5773,7 @@
           <a:p>
             <a:fld id="{6A7ECD7F-C8E1-4D43-90D0-5DE66B274888}" type="datetimeFigureOut">
               <a:rPr lang="en-US" smtClean="0"/>
-              <a:t>2/20/2023</a:t>
+              <a:t>2/27/2023</a:t>
             </a:fld>
             <a:endParaRPr lang="en-US"/>
           </a:p>
@@ -6152,7 +6152,7 @@
           <a:p>
             <a:fld id="{6A7ECD7F-C8E1-4D43-90D0-5DE66B274888}" type="datetimeFigureOut">
               <a:rPr lang="en-US" smtClean="0"/>
-              <a:t>2/20/2023</a:t>
+              <a:t>2/27/2023</a:t>
             </a:fld>
             <a:endParaRPr lang="en-US"/>
           </a:p>
@@ -6270,7 +6270,7 @@
           <a:p>
             <a:fld id="{6A7ECD7F-C8E1-4D43-90D0-5DE66B274888}" type="datetimeFigureOut">
               <a:rPr lang="en-US" smtClean="0"/>
-              <a:t>2/20/2023</a:t>
+              <a:t>2/27/2023</a:t>
             </a:fld>
             <a:endParaRPr lang="en-US"/>
           </a:p>
@@ -6441,7 +6441,7 @@
           <a:p>
             <a:fld id="{6A7ECD7F-C8E1-4D43-90D0-5DE66B274888}" type="datetimeFigureOut">
               <a:rPr lang="en-US" smtClean="0"/>
-              <a:t>2/20/2023</a:t>
+              <a:t>2/27/2023</a:t>
             </a:fld>
             <a:endParaRPr lang="en-US"/>
           </a:p>
@@ -6795,7 +6795,7 @@
           <a:p>
             <a:fld id="{6A7ECD7F-C8E1-4D43-90D0-5DE66B274888}" type="datetimeFigureOut">
               <a:rPr lang="en-US" smtClean="0"/>
-              <a:t>2/20/2023</a:t>
+              <a:t>2/27/2023</a:t>
             </a:fld>
             <a:endParaRPr lang="en-US"/>
           </a:p>
@@ -7172,7 +7172,7 @@
           <a:p>
             <a:fld id="{6A7ECD7F-C8E1-4D43-90D0-5DE66B274888}" type="datetimeFigureOut">
               <a:rPr lang="en-US" smtClean="0"/>
-              <a:t>2/20/2023</a:t>
+              <a:t>2/27/2023</a:t>
             </a:fld>
             <a:endParaRPr lang="en-US"/>
           </a:p>
@@ -7459,7 +7459,7 @@
           <a:p>
             <a:fld id="{6A7ECD7F-C8E1-4D43-90D0-5DE66B274888}" type="datetimeFigureOut">
               <a:rPr lang="en-US" smtClean="0"/>
-              <a:t>2/20/2023</a:t>
+              <a:t>2/27/2023</a:t>
             </a:fld>
             <a:endParaRPr lang="en-US"/>
           </a:p>
@@ -9291,6 +9291,7 @@
           <a:bodyPr/>
           <a:lstStyle/>
           <a:p>
+            <a:pPr algn="just"/>
             <a:r>
               <a:rPr lang="en-US" dirty="0">
                 <a:solidFill>
@@ -9334,6 +9335,7 @@
             </a:endParaRPr>
           </a:p>
           <a:p>
+            <a:pPr algn="just"/>
             <a:r>
               <a:rPr lang="en-US" dirty="0" smtClean="0">
                 <a:solidFill>
@@ -10104,8 +10106,49 @@
         </p:blipFill>
         <p:spPr bwMode="auto">
           <a:xfrm>
-            <a:off x="8512591" y="3957320"/>
-            <a:ext cx="947673" cy="320040"/>
+            <a:off x="8420004" y="3972566"/>
+            <a:ext cx="690711" cy="233261"/>
+          </a:xfrm>
+          <a:prstGeom prst="rect">
+            <a:avLst/>
+          </a:prstGeom>
+          <a:noFill/>
+          <a:extLst>
+            <a:ext uri="{909E8E84-426E-40DD-AFC4-6F175D3DCCD1}">
+              <a14:hiddenFill xmlns:a14="http://schemas.microsoft.com/office/drawing/2010/main">
+                <a:solidFill>
+                  <a:srgbClr val="FFFFFF"/>
+                </a:solidFill>
+              </a14:hiddenFill>
+            </a:ext>
+          </a:extLst>
+        </p:spPr>
+      </p:pic>
+      <p:pic>
+        <p:nvPicPr>
+          <p:cNvPr id="15" name="Picture 2" descr="In Progress Stamp&quot; Images – Browse 17 Stock Photos, Vectors, and Video |  Adobe Stock"/>
+          <p:cNvPicPr>
+            <a:picLocks noChangeAspect="1" noChangeArrowheads="1"/>
+          </p:cNvPicPr>
+          <p:nvPr/>
+        </p:nvPicPr>
+        <p:blipFill>
+          <a:blip r:embed="rId9" cstate="print">
+            <a:extLst>
+              <a:ext uri="{28A0092B-C50C-407E-A947-70E740481C1C}">
+                <a14:useLocalDpi xmlns:a14="http://schemas.microsoft.com/office/drawing/2010/main" val="0"/>
+              </a:ext>
+            </a:extLst>
+          </a:blip>
+          <a:srcRect/>
+          <a:stretch>
+            <a:fillRect/>
+          </a:stretch>
+        </p:blipFill>
+        <p:spPr bwMode="auto">
+          <a:xfrm>
+            <a:off x="6379219" y="4172097"/>
+            <a:ext cx="623391" cy="210526"/>
           </a:xfrm>
           <a:prstGeom prst="rect">
             <a:avLst/>

</xml_diff>